<commit_message>
updated to latest version
</commit_message>
<xml_diff>
--- a/rec_program/format_error_graphs.pptx
+++ b/rec_program/format_error_graphs.pptx
@@ -106,11 +106,6 @@
     <p:sldId id="354" r:id="rId105"/>
     <p:sldId id="355" r:id="rId106"/>
     <p:sldId id="356" r:id="rId107"/>
-    <p:sldId id="357" r:id="rId108"/>
-    <p:sldId id="358" r:id="rId109"/>
-    <p:sldId id="359" r:id="rId110"/>
-    <p:sldId id="360" r:id="rId111"/>
-    <p:sldId id="361" r:id="rId112"/>
   </p:sldIdLst>
   <p:sldSz cx="9144000" cy="6858000" type="screen4x3"/>
   <p:notesSz cx="6858000" cy="9144000"/>
@@ -3274,7 +3269,7 @@
           <a:lstStyle/>
           <a:p>
             <a:r>
-              <a:t>RMSE xvid-LS_x : 0.013518166856826797</a:t>
+              <a:t>RMSE xvid-LS_y : 0.00758370254544715</a:t>
             </a:r>
           </a:p>
         </p:txBody>
@@ -3378,7 +3373,7 @@
           <a:lstStyle/>
           <a:p>
             <a:r>
-              <a:t>RMSE b48r-LS_y : 0.005225805951829265</a:t>
+              <a:t>RMSE b48r-LS_z : 0.05422517162491664</a:t>
             </a:r>
           </a:p>
         </p:txBody>
@@ -3482,7 +3477,7 @@
           <a:lstStyle/>
           <a:p>
             <a:r>
-              <a:t>RMSE b48r-TR_y : 0.0033223508189761455</a:t>
+              <a:t>RMSE b48r-TR_z : 0.13853737019637816</a:t>
             </a:r>
           </a:p>
         </p:txBody>
@@ -3512,67 +3507,43 @@
             <a:spLocks noGrp="1"/>
           </p:cNvSpPr>
           <p:nvPr>
-            <p:ph type="ctrTitle"/>
-          </p:nvPr>
-        </p:nvSpPr>
-        <p:spPr/>
-        <p:txBody>
-          <a:bodyPr/>
-          <a:lstStyle/>
-          <a:p/>
-        </p:txBody>
-      </p:sp>
-      <p:sp>
-        <p:nvSpPr>
-          <p:cNvPr id="3" name="Subtitle 2"/>
-          <p:cNvSpPr>
-            <a:spLocks noGrp="1"/>
-          </p:cNvSpPr>
-          <p:nvPr>
-            <p:ph type="subTitle" idx="1"/>
-          </p:nvPr>
-        </p:nvSpPr>
-        <p:spPr/>
-        <p:txBody>
-          <a:bodyPr/>
-          <a:lstStyle/>
-          <a:p/>
-        </p:txBody>
-      </p:sp>
-      <p:pic>
-        <p:nvPicPr>
-          <p:cNvPr id="4" name="Picture 3" descr="graph.jpg"/>
-          <p:cNvPicPr>
-            <a:picLocks noChangeAspect="1"/>
-          </p:cNvPicPr>
-          <p:nvPr/>
-        </p:nvPicPr>
-        <p:blipFill>
-          <a:blip r:embed="rId2"/>
-          <a:stretch>
-            <a:fillRect/>
-          </a:stretch>
-        </p:blipFill>
-        <p:spPr>
-          <a:xfrm>
-            <a:off x="914400" y="914400"/>
-            <a:ext cx="6096000" cy="4572000"/>
-          </a:xfrm>
-          <a:prstGeom prst="rect">
-            <a:avLst/>
-          </a:prstGeom>
-        </p:spPr>
-      </p:pic>
-      <p:sp>
-        <p:nvSpPr>
-          <p:cNvPr id="5" name="TextBox 4"/>
+            <p:ph type="title"/>
+          </p:nvPr>
+        </p:nvSpPr>
+        <p:spPr/>
+        <p:txBody>
+          <a:bodyPr/>
+          <a:lstStyle/>
+          <a:p/>
+        </p:txBody>
+      </p:sp>
+      <p:sp>
+        <p:nvSpPr>
+          <p:cNvPr id="3" name="Content Placeholder 2"/>
+          <p:cNvSpPr>
+            <a:spLocks noGrp="1"/>
+          </p:cNvSpPr>
+          <p:nvPr>
+            <p:ph idx="1"/>
+          </p:nvPr>
+        </p:nvSpPr>
+        <p:spPr/>
+        <p:txBody>
+          <a:bodyPr/>
+          <a:lstStyle/>
+          <a:p/>
+        </p:txBody>
+      </p:sp>
+      <p:sp>
+        <p:nvSpPr>
+          <p:cNvPr id="4" name="TextBox 3"/>
           <p:cNvSpPr txBox="1"/>
           <p:nvPr/>
         </p:nvSpPr>
         <p:spPr>
           <a:xfrm>
-            <a:off x="1" y="1"/>
-            <a:ext cx="3" cy="3"/>
+            <a:off x="1828800" y="1828800"/>
+            <a:ext cx="1828800" cy="1828800"/>
           </a:xfrm>
           <a:prstGeom prst="rect">
             <a:avLst/>
@@ -3586,528 +3557,32 @@
           <a:lstStyle/>
           <a:p>
             <a:r>
-              <a:t>RMSE xvid-TR_z : 0.04813443557812087</a:t>
-            </a:r>
-          </a:p>
-        </p:txBody>
-      </p:sp>
-    </p:spTree>
-  </p:cSld>
-  <p:clrMapOvr>
-    <a:masterClrMapping/>
-  </p:clrMapOvr>
-</p:sld>
-</file>
-
-<file path=ppt/slides/slide102.xml><?xml version="1.0" encoding="utf-8"?>
-<p:sld xmlns:a="http://schemas.openxmlformats.org/drawingml/2006/main" xmlns:p="http://schemas.openxmlformats.org/presentationml/2006/main" xmlns:r="http://schemas.openxmlformats.org/officeDocument/2006/relationships">
-  <p:cSld>
-    <p:spTree>
-      <p:nvGrpSpPr>
-        <p:cNvPr id="1" name=""/>
-        <p:cNvGrpSpPr/>
-        <p:nvPr/>
-      </p:nvGrpSpPr>
-      <p:grpSpPr/>
-      <p:sp>
-        <p:nvSpPr>
-          <p:cNvPr id="2" name="Title 1"/>
-          <p:cNvSpPr>
-            <a:spLocks noGrp="1"/>
-          </p:cNvSpPr>
-          <p:nvPr>
-            <p:ph type="ctrTitle"/>
-          </p:nvPr>
-        </p:nvSpPr>
-        <p:spPr/>
-        <p:txBody>
-          <a:bodyPr/>
-          <a:lstStyle/>
-          <a:p/>
-        </p:txBody>
-      </p:sp>
-      <p:sp>
-        <p:nvSpPr>
-          <p:cNvPr id="3" name="Subtitle 2"/>
-          <p:cNvSpPr>
-            <a:spLocks noGrp="1"/>
-          </p:cNvSpPr>
-          <p:nvPr>
-            <p:ph type="subTitle" idx="1"/>
-          </p:nvPr>
-        </p:nvSpPr>
-        <p:spPr/>
-        <p:txBody>
-          <a:bodyPr/>
-          <a:lstStyle/>
-          <a:p/>
-        </p:txBody>
-      </p:sp>
-      <p:pic>
-        <p:nvPicPr>
-          <p:cNvPr id="4" name="Picture 3" descr="graph.jpg"/>
-          <p:cNvPicPr>
-            <a:picLocks noChangeAspect="1"/>
-          </p:cNvPicPr>
-          <p:nvPr/>
-        </p:nvPicPr>
-        <p:blipFill>
-          <a:blip r:embed="rId2"/>
-          <a:stretch>
-            <a:fillRect/>
-          </a:stretch>
-        </p:blipFill>
-        <p:spPr>
-          <a:xfrm>
-            <a:off x="914400" y="914400"/>
-            <a:ext cx="6096000" cy="4572000"/>
-          </a:xfrm>
-          <a:prstGeom prst="rect">
-            <a:avLst/>
-          </a:prstGeom>
-        </p:spPr>
-      </p:pic>
-      <p:sp>
-        <p:nvSpPr>
-          <p:cNvPr id="5" name="TextBox 4"/>
-          <p:cNvSpPr txBox="1"/>
-          <p:nvPr/>
-        </p:nvSpPr>
-        <p:spPr>
-          <a:xfrm>
-            <a:off x="1" y="1"/>
-            <a:ext cx="3" cy="3"/>
-          </a:xfrm>
-          <a:prstGeom prst="rect">
-            <a:avLst/>
-          </a:prstGeom>
-          <a:noFill/>
-        </p:spPr>
-        <p:txBody>
-          <a:bodyPr wrap="none">
-            <a:spAutoFit/>
-          </a:bodyPr>
-          <a:lstStyle/>
-          <a:p>
-            <a:r>
-              <a:t>RMSE iyuv-TR_z : 0.04776412905926113</a:t>
-            </a:r>
-          </a:p>
-        </p:txBody>
-      </p:sp>
-    </p:spTree>
-  </p:cSld>
-  <p:clrMapOvr>
-    <a:masterClrMapping/>
-  </p:clrMapOvr>
-</p:sld>
-</file>
-
-<file path=ppt/slides/slide103.xml><?xml version="1.0" encoding="utf-8"?>
-<p:sld xmlns:a="http://schemas.openxmlformats.org/drawingml/2006/main" xmlns:p="http://schemas.openxmlformats.org/presentationml/2006/main" xmlns:r="http://schemas.openxmlformats.org/officeDocument/2006/relationships">
-  <p:cSld>
-    <p:spTree>
-      <p:nvGrpSpPr>
-        <p:cNvPr id="1" name=""/>
-        <p:cNvGrpSpPr/>
-        <p:nvPr/>
-      </p:nvGrpSpPr>
-      <p:grpSpPr/>
-      <p:sp>
-        <p:nvSpPr>
-          <p:cNvPr id="2" name="Title 1"/>
-          <p:cNvSpPr>
-            <a:spLocks noGrp="1"/>
-          </p:cNvSpPr>
-          <p:nvPr>
-            <p:ph type="ctrTitle"/>
-          </p:nvPr>
-        </p:nvSpPr>
-        <p:spPr/>
-        <p:txBody>
-          <a:bodyPr/>
-          <a:lstStyle/>
-          <a:p/>
-        </p:txBody>
-      </p:sp>
-      <p:sp>
-        <p:nvSpPr>
-          <p:cNvPr id="3" name="Subtitle 2"/>
-          <p:cNvSpPr>
-            <a:spLocks noGrp="1"/>
-          </p:cNvSpPr>
-          <p:nvPr>
-            <p:ph type="subTitle" idx="1"/>
-          </p:nvPr>
-        </p:nvSpPr>
-        <p:spPr/>
-        <p:txBody>
-          <a:bodyPr/>
-          <a:lstStyle/>
-          <a:p/>
-        </p:txBody>
-      </p:sp>
-      <p:pic>
-        <p:nvPicPr>
-          <p:cNvPr id="4" name="Picture 3" descr="graph.jpg"/>
-          <p:cNvPicPr>
-            <a:picLocks noChangeAspect="1"/>
-          </p:cNvPicPr>
-          <p:nvPr/>
-        </p:nvPicPr>
-        <p:blipFill>
-          <a:blip r:embed="rId2"/>
-          <a:stretch>
-            <a:fillRect/>
-          </a:stretch>
-        </p:blipFill>
-        <p:spPr>
-          <a:xfrm>
-            <a:off x="914400" y="914400"/>
-            <a:ext cx="6096000" cy="4572000"/>
-          </a:xfrm>
-          <a:prstGeom prst="rect">
-            <a:avLst/>
-          </a:prstGeom>
-        </p:spPr>
-      </p:pic>
-      <p:sp>
-        <p:nvSpPr>
-          <p:cNvPr id="5" name="TextBox 4"/>
-          <p:cNvSpPr txBox="1"/>
-          <p:nvPr/>
-        </p:nvSpPr>
-        <p:spPr>
-          <a:xfrm>
-            <a:off x="1" y="1"/>
-            <a:ext cx="3" cy="3"/>
-          </a:xfrm>
-          <a:prstGeom prst="rect">
-            <a:avLst/>
-          </a:prstGeom>
-          <a:noFill/>
-        </p:spPr>
-        <p:txBody>
-          <a:bodyPr wrap="none">
-            <a:spAutoFit/>
-          </a:bodyPr>
-          <a:lstStyle/>
-          <a:p>
-            <a:r>
-              <a:t>RMSE mjpg-TR_z : 0.04778723173892221</a:t>
-            </a:r>
-          </a:p>
-        </p:txBody>
-      </p:sp>
-    </p:spTree>
-  </p:cSld>
-  <p:clrMapOvr>
-    <a:masterClrMapping/>
-  </p:clrMapOvr>
-</p:sld>
-</file>
-
-<file path=ppt/slides/slide104.xml><?xml version="1.0" encoding="utf-8"?>
-<p:sld xmlns:a="http://schemas.openxmlformats.org/drawingml/2006/main" xmlns:p="http://schemas.openxmlformats.org/presentationml/2006/main" xmlns:r="http://schemas.openxmlformats.org/officeDocument/2006/relationships">
-  <p:cSld>
-    <p:spTree>
-      <p:nvGrpSpPr>
-        <p:cNvPr id="1" name=""/>
-        <p:cNvGrpSpPr/>
-        <p:nvPr/>
-      </p:nvGrpSpPr>
-      <p:grpSpPr/>
-      <p:sp>
-        <p:nvSpPr>
-          <p:cNvPr id="2" name="Title 1"/>
-          <p:cNvSpPr>
-            <a:spLocks noGrp="1"/>
-          </p:cNvSpPr>
-          <p:nvPr>
-            <p:ph type="ctrTitle"/>
-          </p:nvPr>
-        </p:nvSpPr>
-        <p:spPr/>
-        <p:txBody>
-          <a:bodyPr/>
-          <a:lstStyle/>
-          <a:p/>
-        </p:txBody>
-      </p:sp>
-      <p:sp>
-        <p:nvSpPr>
-          <p:cNvPr id="3" name="Subtitle 2"/>
-          <p:cNvSpPr>
-            <a:spLocks noGrp="1"/>
-          </p:cNvSpPr>
-          <p:nvPr>
-            <p:ph type="subTitle" idx="1"/>
-          </p:nvPr>
-        </p:nvSpPr>
-        <p:spPr/>
-        <p:txBody>
-          <a:bodyPr/>
-          <a:lstStyle/>
-          <a:p/>
-        </p:txBody>
-      </p:sp>
-      <p:pic>
-        <p:nvPicPr>
-          <p:cNvPr id="4" name="Picture 3" descr="graph.jpg"/>
-          <p:cNvPicPr>
-            <a:picLocks noChangeAspect="1"/>
-          </p:cNvPicPr>
-          <p:nvPr/>
-        </p:nvPicPr>
-        <p:blipFill>
-          <a:blip r:embed="rId2"/>
-          <a:stretch>
-            <a:fillRect/>
-          </a:stretch>
-        </p:blipFill>
-        <p:spPr>
-          <a:xfrm>
-            <a:off x="914400" y="914400"/>
-            <a:ext cx="6096000" cy="4572000"/>
-          </a:xfrm>
-          <a:prstGeom prst="rect">
-            <a:avLst/>
-          </a:prstGeom>
-        </p:spPr>
-      </p:pic>
-      <p:sp>
-        <p:nvSpPr>
-          <p:cNvPr id="5" name="TextBox 4"/>
-          <p:cNvSpPr txBox="1"/>
-          <p:nvPr/>
-        </p:nvSpPr>
-        <p:spPr>
-          <a:xfrm>
-            <a:off x="1" y="1"/>
-            <a:ext cx="3" cy="3"/>
-          </a:xfrm>
-          <a:prstGeom prst="rect">
-            <a:avLst/>
-          </a:prstGeom>
-          <a:noFill/>
-        </p:spPr>
-        <p:txBody>
-          <a:bodyPr wrap="none">
-            <a:spAutoFit/>
-          </a:bodyPr>
-          <a:lstStyle/>
-          <a:p>
-            <a:r>
-              <a:t>RMSE mp4v-TR_z : 0.04813443557812087</a:t>
-            </a:r>
-          </a:p>
-        </p:txBody>
-      </p:sp>
-    </p:spTree>
-  </p:cSld>
-  <p:clrMapOvr>
-    <a:masterClrMapping/>
-  </p:clrMapOvr>
-</p:sld>
-</file>
-
-<file path=ppt/slides/slide105.xml><?xml version="1.0" encoding="utf-8"?>
-<p:sld xmlns:a="http://schemas.openxmlformats.org/drawingml/2006/main" xmlns:p="http://schemas.openxmlformats.org/presentationml/2006/main" xmlns:r="http://schemas.openxmlformats.org/officeDocument/2006/relationships">
-  <p:cSld>
-    <p:spTree>
-      <p:nvGrpSpPr>
-        <p:cNvPr id="1" name=""/>
-        <p:cNvGrpSpPr/>
-        <p:nvPr/>
-      </p:nvGrpSpPr>
-      <p:grpSpPr/>
-      <p:sp>
-        <p:nvSpPr>
-          <p:cNvPr id="2" name="Title 1"/>
-          <p:cNvSpPr>
-            <a:spLocks noGrp="1"/>
-          </p:cNvSpPr>
-          <p:nvPr>
-            <p:ph type="ctrTitle"/>
-          </p:nvPr>
-        </p:nvSpPr>
-        <p:spPr/>
-        <p:txBody>
-          <a:bodyPr/>
-          <a:lstStyle/>
-          <a:p/>
-        </p:txBody>
-      </p:sp>
-      <p:sp>
-        <p:nvSpPr>
-          <p:cNvPr id="3" name="Subtitle 2"/>
-          <p:cNvSpPr>
-            <a:spLocks noGrp="1"/>
-          </p:cNvSpPr>
-          <p:nvPr>
-            <p:ph type="subTitle" idx="1"/>
-          </p:nvPr>
-        </p:nvSpPr>
-        <p:spPr/>
-        <p:txBody>
-          <a:bodyPr/>
-          <a:lstStyle/>
-          <a:p/>
-        </p:txBody>
-      </p:sp>
-      <p:pic>
-        <p:nvPicPr>
-          <p:cNvPr id="4" name="Picture 3" descr="graph.jpg"/>
-          <p:cNvPicPr>
-            <a:picLocks noChangeAspect="1"/>
-          </p:cNvPicPr>
-          <p:nvPr/>
-        </p:nvPicPr>
-        <p:blipFill>
-          <a:blip r:embed="rId2"/>
-          <a:stretch>
-            <a:fillRect/>
-          </a:stretch>
-        </p:blipFill>
-        <p:spPr>
-          <a:xfrm>
-            <a:off x="914400" y="914400"/>
-            <a:ext cx="6096000" cy="4572000"/>
-          </a:xfrm>
-          <a:prstGeom prst="rect">
-            <a:avLst/>
-          </a:prstGeom>
-        </p:spPr>
-      </p:pic>
-      <p:sp>
-        <p:nvSpPr>
-          <p:cNvPr id="5" name="TextBox 4"/>
-          <p:cNvSpPr txBox="1"/>
-          <p:nvPr/>
-        </p:nvSpPr>
-        <p:spPr>
-          <a:xfrm>
-            <a:off x="1" y="1"/>
-            <a:ext cx="3" cy="3"/>
-          </a:xfrm>
-          <a:prstGeom prst="rect">
-            <a:avLst/>
-          </a:prstGeom>
-          <a:noFill/>
-        </p:spPr>
-        <p:txBody>
-          <a:bodyPr wrap="none">
-            <a:spAutoFit/>
-          </a:bodyPr>
-          <a:lstStyle/>
-          <a:p>
-            <a:r>
-              <a:t>RMSE b48r-TR_z : 0.04776412905926113</a:t>
-            </a:r>
-          </a:p>
-        </p:txBody>
-      </p:sp>
-    </p:spTree>
-  </p:cSld>
-  <p:clrMapOvr>
-    <a:masterClrMapping/>
-  </p:clrMapOvr>
-</p:sld>
-</file>
-
-<file path=ppt/slides/slide106.xml><?xml version="1.0" encoding="utf-8"?>
-<p:sld xmlns:a="http://schemas.openxmlformats.org/drawingml/2006/main" xmlns:p="http://schemas.openxmlformats.org/presentationml/2006/main" xmlns:r="http://schemas.openxmlformats.org/officeDocument/2006/relationships">
-  <p:cSld>
-    <p:spTree>
-      <p:nvGrpSpPr>
-        <p:cNvPr id="1" name=""/>
-        <p:cNvGrpSpPr/>
-        <p:nvPr/>
-      </p:nvGrpSpPr>
-      <p:grpSpPr/>
-      <p:sp>
-        <p:nvSpPr>
-          <p:cNvPr id="2" name="Title 1"/>
-          <p:cNvSpPr>
-            <a:spLocks noGrp="1"/>
-          </p:cNvSpPr>
-          <p:nvPr>
-            <p:ph type="title"/>
-          </p:nvPr>
-        </p:nvSpPr>
-        <p:spPr/>
-        <p:txBody>
-          <a:bodyPr/>
-          <a:lstStyle/>
-          <a:p/>
-        </p:txBody>
-      </p:sp>
-      <p:sp>
-        <p:nvSpPr>
-          <p:cNvPr id="3" name="Content Placeholder 2"/>
-          <p:cNvSpPr>
-            <a:spLocks noGrp="1"/>
-          </p:cNvSpPr>
-          <p:nvPr>
-            <p:ph idx="1"/>
-          </p:nvPr>
-        </p:nvSpPr>
-        <p:spPr/>
-        <p:txBody>
-          <a:bodyPr/>
-          <a:lstStyle/>
-          <a:p/>
-        </p:txBody>
-      </p:sp>
-      <p:sp>
-        <p:nvSpPr>
-          <p:cNvPr id="4" name="TextBox 3"/>
-          <p:cNvSpPr txBox="1"/>
-          <p:nvPr/>
-        </p:nvSpPr>
-        <p:spPr>
-          <a:xfrm>
-            <a:off x="1828800" y="1828800"/>
-            <a:ext cx="1828800" cy="1828800"/>
-          </a:xfrm>
-          <a:prstGeom prst="rect">
-            <a:avLst/>
-          </a:prstGeom>
-          <a:noFill/>
-        </p:spPr>
-        <p:txBody>
-          <a:bodyPr wrap="none">
-            <a:spAutoFit/>
-          </a:bodyPr>
-          <a:lstStyle/>
-          <a:p>
-            <a:r>
               <a:t>Cumulative error for each codec </a:t>
             </a:r>
           </a:p>
           <a:p>
             <a:r>
-              <a:t>RMSE xvid : 0.09201491707746633</a:t>
-            </a:r>
-          </a:p>
-          <a:p>
-            <a:r>
-              <a:t>RMSE iyuv : 0.06574200607239329</a:t>
-            </a:r>
-          </a:p>
-          <a:p>
-            <a:r>
-              <a:t>RMSE mjpg : 0.07859782277497251</a:t>
-            </a:r>
-          </a:p>
-          <a:p>
-            <a:r>
-              <a:t>RMSE mp4v : 0.09201491707746633</a:t>
-            </a:r>
-          </a:p>
-          <a:p>
-            <a:r>
-              <a:t>RMSE b48r : 0.06574200607239329</a:t>
+              <a:t>RMSE xvid : 0.046384703669972605</a:t>
+            </a:r>
+          </a:p>
+          <a:p>
+            <a:r>
+              <a:t>RMSE iyuv : 0.033490452416486</a:t>
+            </a:r>
+          </a:p>
+          <a:p>
+            <a:r>
+              <a:t>RMSE mjpg : 0.028191299514580947</a:t>
+            </a:r>
+          </a:p>
+          <a:p>
+            <a:r>
+              <a:t>RMSE mp4v : 0.046384703669972605</a:t>
+            </a:r>
+          </a:p>
+          <a:p>
+            <a:r>
+              <a:t>RMSE b48r : 0.033490452416486</a:t>
             </a:r>
           </a:p>
           <a:p/>
@@ -4212,7 +3687,7 @@
           <a:lstStyle/>
           <a:p>
             <a:r>
-              <a:t>RMSE xvid-LS_z : 0.08084960514100571</a:t>
+              <a:t>RMSE xvid-LE_x : 0.018973636604351293</a:t>
             </a:r>
           </a:p>
         </p:txBody>
@@ -4316,7 +3791,7 @@
           <a:lstStyle/>
           <a:p>
             <a:r>
-              <a:t>RMSE iyuv-LS_z : 0.05034429985406133</a:t>
+              <a:t>RMSE iyuv-LE_x : 0.018633470163545704</a:t>
             </a:r>
           </a:p>
         </p:txBody>
@@ -4420,7 +3895,7 @@
           <a:lstStyle/>
           <a:p>
             <a:r>
-              <a:t>RMSE mjpg-LS_z : 0.04560234015129498</a:t>
+              <a:t>RMSE mjpg-LE_x : 0.018416555103437798</a:t>
             </a:r>
           </a:p>
         </p:txBody>
@@ -4524,7 +3999,7 @@
           <a:lstStyle/>
           <a:p>
             <a:r>
-              <a:t>RMSE mp4v-LS_z : 0.08084960514100571</a:t>
+              <a:t>RMSE mp4v-LE_x : 0.018973636604351293</a:t>
             </a:r>
           </a:p>
         </p:txBody>
@@ -4628,7 +4103,7 @@
           <a:lstStyle/>
           <a:p>
             <a:r>
-              <a:t>RMSE b48r-LS_z : 0.05034429985406133</a:t>
+              <a:t>RMSE b48r-LE_x : 0.018633470163545704</a:t>
             </a:r>
           </a:p>
         </p:txBody>
@@ -4732,7 +4207,7 @@
           <a:lstStyle/>
           <a:p>
             <a:r>
-              <a:t>RMSE xvid-LE_x : 0.015251456092137156</a:t>
+              <a:t>RMSE xvid-LE_y : 0.00996275724814071</a:t>
             </a:r>
           </a:p>
         </p:txBody>
@@ -4836,7 +4311,7 @@
           <a:lstStyle/>
           <a:p>
             <a:r>
-              <a:t>RMSE iyuv-LE_x : 0.013993173566369267</a:t>
+              <a:t>RMSE iyuv-LE_y : 0.00963703276237586</a:t>
             </a:r>
           </a:p>
         </p:txBody>
@@ -4940,7 +4415,7 @@
           <a:lstStyle/>
           <a:p>
             <a:r>
-              <a:t>RMSE mjpg-LE_x : 0.013756652160316707</a:t>
+              <a:t>RMSE mjpg-LE_y : 0.009354401756400652</a:t>
             </a:r>
           </a:p>
         </p:txBody>
@@ -5044,7 +4519,7 @@
           <a:lstStyle/>
           <a:p>
             <a:r>
-              <a:t>RMSE mp4v-LE_x : 0.015251456092137156</a:t>
+              <a:t>RMSE mp4v-LE_y : 0.00996275724814071</a:t>
             </a:r>
           </a:p>
         </p:txBody>
@@ -5148,7 +4623,7 @@
           <a:lstStyle/>
           <a:p>
             <a:r>
-              <a:t>RMSE iyuv-LS_x : 0.012208633983257363</a:t>
+              <a:t>RMSE iyuv-LS_y : 0.005270615922672796</a:t>
             </a:r>
           </a:p>
         </p:txBody>
@@ -5252,7 +4727,7 @@
           <a:lstStyle/>
           <a:p>
             <a:r>
-              <a:t>RMSE b48r-LE_x : 0.013993173566369267</a:t>
+              <a:t>RMSE b48r-LE_y : 0.00963703276237586</a:t>
             </a:r>
           </a:p>
         </p:txBody>
@@ -5356,7 +4831,7 @@
           <a:lstStyle/>
           <a:p>
             <a:r>
-              <a:t>RMSE xvid-LE_y : 0.008494182151076977</a:t>
+              <a:t>RMSE xvid-LE_z : 0.05873520150392389</a:t>
             </a:r>
           </a:p>
         </p:txBody>
@@ -5460,7 +4935,7 @@
           <a:lstStyle/>
           <a:p>
             <a:r>
-              <a:t>RMSE iyuv-LE_y : 0.007981625248229771</a:t>
+              <a:t>RMSE iyuv-LE_z : 0.05871265913142613</a:t>
             </a:r>
           </a:p>
         </p:txBody>
@@ -5564,7 +5039,7 @@
           <a:lstStyle/>
           <a:p>
             <a:r>
-              <a:t>RMSE mjpg-LE_y : 0.007775455185538979</a:t>
+              <a:t>RMSE mjpg-LE_z : 0.05830890828722916</a:t>
             </a:r>
           </a:p>
         </p:txBody>
@@ -5668,7 +5143,7 @@
           <a:lstStyle/>
           <a:p>
             <a:r>
-              <a:t>RMSE mp4v-LE_y : 0.008494182151076977</a:t>
+              <a:t>RMSE mp4v-LE_z : 0.05873520150392389</a:t>
             </a:r>
           </a:p>
         </p:txBody>
@@ -5772,7 +5247,7 @@
           <a:lstStyle/>
           <a:p>
             <a:r>
-              <a:t>RMSE b48r-LE_y : 0.007981625248229771</a:t>
+              <a:t>RMSE b48r-LE_z : 0.05871265913142613</a:t>
             </a:r>
           </a:p>
         </p:txBody>
@@ -5876,7 +5351,7 @@
           <a:lstStyle/>
           <a:p>
             <a:r>
-              <a:t>RMSE xvid-LE_z : 0.062851774305595</a:t>
+              <a:t>RMSE xvid-LW_x : 0.01857392260357759</a:t>
             </a:r>
           </a:p>
         </p:txBody>
@@ -5980,7 +5455,7 @@
           <a:lstStyle/>
           <a:p>
             <a:r>
-              <a:t>RMSE iyuv-LE_z : 0.043139743964370716</a:t>
+              <a:t>RMSE iyuv-LW_x : 0.016471951328944953</a:t>
             </a:r>
           </a:p>
         </p:txBody>
@@ -6084,7 +5559,7 @@
           <a:lstStyle/>
           <a:p>
             <a:r>
-              <a:t>RMSE mjpg-LE_z : 0.043483183890590235</a:t>
+              <a:t>RMSE mjpg-LW_x : 0.016843574285674002</a:t>
             </a:r>
           </a:p>
         </p:txBody>
@@ -6188,7 +5663,7 @@
           <a:lstStyle/>
           <a:p>
             <a:r>
-              <a:t>RMSE mp4v-LE_z : 0.062851774305595</a:t>
+              <a:t>RMSE mp4v-LW_x : 0.01857392260357759</a:t>
             </a:r>
           </a:p>
         </p:txBody>
@@ -6292,7 +5767,7 @@
           <a:lstStyle/>
           <a:p>
             <a:r>
-              <a:t>RMSE mjpg-LS_x : 0.011802775948989624</a:t>
+              <a:t>RMSE mjpg-LS_y : 0.0053066877439743735</a:t>
             </a:r>
           </a:p>
         </p:txBody>
@@ -6396,7 +5871,7 @@
           <a:lstStyle/>
           <a:p>
             <a:r>
-              <a:t>RMSE b48r-LE_z : 0.043139743964370716</a:t>
+              <a:t>RMSE b48r-LW_x : 0.016471951328944953</a:t>
             </a:r>
           </a:p>
         </p:txBody>
@@ -6500,7 +5975,7 @@
           <a:lstStyle/>
           <a:p>
             <a:r>
-              <a:t>RMSE xvid-LW_x : 0.023095467525444596</a:t>
+              <a:t>RMSE xvid-LW_y : 0.019038354208513422</a:t>
             </a:r>
           </a:p>
         </p:txBody>
@@ -6604,7 +6079,7 @@
           <a:lstStyle/>
           <a:p>
             <a:r>
-              <a:t>RMSE iyuv-LW_x : 0.02012034921840459</a:t>
+              <a:t>RMSE iyuv-LW_y : 0.019800697526350584</a:t>
             </a:r>
           </a:p>
         </p:txBody>
@@ -6708,7 +6183,7 @@
           <a:lstStyle/>
           <a:p>
             <a:r>
-              <a:t>RMSE mjpg-LW_x : 0.020828687715110598</a:t>
+              <a:t>RMSE mjpg-LW_y : 0.01886587264064612</a:t>
             </a:r>
           </a:p>
         </p:txBody>
@@ -6812,7 +6287,7 @@
           <a:lstStyle/>
           <a:p>
             <a:r>
-              <a:t>RMSE mp4v-LW_x : 0.023095467525444596</a:t>
+              <a:t>RMSE mp4v-LW_y : 0.019038354208513422</a:t>
             </a:r>
           </a:p>
         </p:txBody>
@@ -6916,7 +6391,7 @@
           <a:lstStyle/>
           <a:p>
             <a:r>
-              <a:t>RMSE b48r-LW_x : 0.02012034921840459</a:t>
+              <a:t>RMSE b48r-LW_y : 0.019800697526350584</a:t>
             </a:r>
           </a:p>
         </p:txBody>
@@ -7020,7 +6495,7 @@
           <a:lstStyle/>
           <a:p>
             <a:r>
-              <a:t>RMSE xvid-LW_y : 0.03898570962877043</a:t>
+              <a:t>RMSE xvid-LW_z : 0.0643742432603156</a:t>
             </a:r>
           </a:p>
         </p:txBody>
@@ -7124,7 +6599,7 @@
           <a:lstStyle/>
           <a:p>
             <a:r>
-              <a:t>RMSE iyuv-LW_y : 0.021041331403276093</a:t>
+              <a:t>RMSE iyuv-LW_z : 0.05514471546959551</a:t>
             </a:r>
           </a:p>
         </p:txBody>
@@ -7228,7 +6703,7 @@
           <a:lstStyle/>
           <a:p>
             <a:r>
-              <a:t>RMSE mjpg-LW_y : 0.03567167693808295</a:t>
+              <a:t>RMSE mjpg-LW_z : 0.05432976859053332</a:t>
             </a:r>
           </a:p>
         </p:txBody>
@@ -7332,7 +6807,7 @@
           <a:lstStyle/>
           <a:p>
             <a:r>
-              <a:t>RMSE mp4v-LW_y : 0.03898570962877043</a:t>
+              <a:t>RMSE mp4v-LW_z : 0.0643742432603156</a:t>
             </a:r>
           </a:p>
         </p:txBody>
@@ -7436,7 +6911,7 @@
           <a:lstStyle/>
           <a:p>
             <a:r>
-              <a:t>RMSE mp4v-LS_x : 0.013518166856826797</a:t>
+              <a:t>RMSE mp4v-LS_y : 0.00758370254544715</a:t>
             </a:r>
           </a:p>
         </p:txBody>
@@ -7540,7 +7015,7 @@
           <a:lstStyle/>
           <a:p>
             <a:r>
-              <a:t>RMSE b48r-LW_y : 0.021041331403276093</a:t>
+              <a:t>RMSE b48r-LW_z : 0.05514471546959551</a:t>
             </a:r>
           </a:p>
         </p:txBody>
@@ -7644,7 +7119,7 @@
           <a:lstStyle/>
           <a:p>
             <a:r>
-              <a:t>RMSE xvid-LW_z : 0.10373001386580066</a:t>
+              <a:t>RMSE xvid-RS_x : 0.05124693852876004</a:t>
             </a:r>
           </a:p>
         </p:txBody>
@@ -7748,7 +7223,7 @@
           <a:lstStyle/>
           <a:p>
             <a:r>
-              <a:t>RMSE iyuv-LW_z : 0.05148369265205136</a:t>
+              <a:t>RMSE iyuv-RS_x : 0.051291121134204566</a:t>
             </a:r>
           </a:p>
         </p:txBody>
@@ -7852,7 +7327,7 @@
           <a:lstStyle/>
           <a:p>
             <a:r>
-              <a:t>RMSE mjpg-LW_z : 0.0873277110530441</a:t>
+              <a:t>RMSE mjpg-RS_x : 0.018696183245764185</a:t>
             </a:r>
           </a:p>
         </p:txBody>
@@ -7956,7 +7431,7 @@
           <a:lstStyle/>
           <a:p>
             <a:r>
-              <a:t>RMSE mp4v-LW_z : 0.10373001386580066</a:t>
+              <a:t>RMSE mp4v-RS_x : 0.05124693852876004</a:t>
             </a:r>
           </a:p>
         </p:txBody>
@@ -8060,7 +7535,7 @@
           <a:lstStyle/>
           <a:p>
             <a:r>
-              <a:t>RMSE b48r-LW_z : 0.05148369265205136</a:t>
+              <a:t>RMSE b48r-RS_x : 0.051291121134204566</a:t>
             </a:r>
           </a:p>
         </p:txBody>
@@ -8164,7 +7639,7 @@
           <a:lstStyle/>
           <a:p>
             <a:r>
-              <a:t>RMSE xvid-RS_x : 0.014833645853920763</a:t>
+              <a:t>RMSE xvid-RS_y : 0.016337635516281264</a:t>
             </a:r>
           </a:p>
         </p:txBody>
@@ -8268,7 +7743,7 @@
           <a:lstStyle/>
           <a:p>
             <a:r>
-              <a:t>RMSE iyuv-RS_x : 0.014617027413580026</a:t>
+              <a:t>RMSE iyuv-RS_y : 0.016887168690587973</a:t>
             </a:r>
           </a:p>
         </p:txBody>
@@ -8372,7 +7847,7 @@
           <a:lstStyle/>
           <a:p>
             <a:r>
-              <a:t>RMSE mjpg-RS_x : 0.01480252149139667</a:t>
+              <a:t>RMSE mjpg-RS_y : 0.006884169817899697</a:t>
             </a:r>
           </a:p>
         </p:txBody>
@@ -8476,7 +7951,7 @@
           <a:lstStyle/>
           <a:p>
             <a:r>
-              <a:t>RMSE mp4v-RS_x : 0.014833645853920763</a:t>
+              <a:t>RMSE mp4v-RS_y : 0.016337635516281264</a:t>
             </a:r>
           </a:p>
         </p:txBody>
@@ -8580,7 +8055,7 @@
           <a:lstStyle/>
           <a:p>
             <a:r>
-              <a:t>RMSE b48r-LS_x : 0.012208633983257363</a:t>
+              <a:t>RMSE b48r-LS_y : 0.005270615922672796</a:t>
             </a:r>
           </a:p>
         </p:txBody>
@@ -8684,7 +8159,7 @@
           <a:lstStyle/>
           <a:p>
             <a:r>
-              <a:t>RMSE b48r-RS_x : 0.014617027413580026</a:t>
+              <a:t>RMSE b48r-RS_y : 0.016887168690587973</a:t>
             </a:r>
           </a:p>
         </p:txBody>
@@ -8788,7 +8263,7 @@
           <a:lstStyle/>
           <a:p>
             <a:r>
-              <a:t>RMSE xvid-RS_y : 0.005655000787196374</a:t>
+              <a:t>RMSE xvid-RS_z : 0.1652649317273953</a:t>
             </a:r>
           </a:p>
         </p:txBody>
@@ -8892,7 +8367,7 @@
           <a:lstStyle/>
           <a:p>
             <a:r>
-              <a:t>RMSE iyuv-RS_y : 0.005102551489421394</a:t>
+              <a:t>RMSE iyuv-RS_z : 0.17322255667177436</a:t>
             </a:r>
           </a:p>
         </p:txBody>
@@ -8996,7 +8471,7 @@
           <a:lstStyle/>
           <a:p>
             <a:r>
-              <a:t>RMSE mjpg-RS_y : 0.009900813047850978</a:t>
+              <a:t>RMSE mjpg-RS_z : 0.06570700654843195</a:t>
             </a:r>
           </a:p>
         </p:txBody>
@@ -9100,7 +8575,7 @@
           <a:lstStyle/>
           <a:p>
             <a:r>
-              <a:t>RMSE mp4v-RS_y : 0.005655000787196374</a:t>
+              <a:t>RMSE mp4v-RS_z : 0.1652649317273953</a:t>
             </a:r>
           </a:p>
         </p:txBody>
@@ -9204,7 +8679,7 @@
           <a:lstStyle/>
           <a:p>
             <a:r>
-              <a:t>RMSE b48r-RS_y : 0.005102551489421394</a:t>
+              <a:t>RMSE b48r-RS_z : 0.17322255667177436</a:t>
             </a:r>
           </a:p>
         </p:txBody>
@@ -9308,7 +8783,7 @@
           <a:lstStyle/>
           <a:p>
             <a:r>
-              <a:t>RMSE xvid-RS_z : 0.05000641590932328</a:t>
+              <a:t>RMSE xvid-RE_x : 0.047867688511619655</a:t>
             </a:r>
           </a:p>
         </p:txBody>
@@ -9412,7 +8887,7 @@
           <a:lstStyle/>
           <a:p>
             <a:r>
-              <a:t>RMSE iyuv-RS_z : 0.05166355376846673</a:t>
+              <a:t>RMSE iyuv-RE_x : 0.04923305447584379</a:t>
             </a:r>
           </a:p>
         </p:txBody>
@@ -9516,7 +8991,7 @@
           <a:lstStyle/>
           <a:p>
             <a:r>
-              <a:t>RMSE mjpg-RS_z : 0.05024248659256519</a:t>
+              <a:t>RMSE mjpg-RE_x : 0.019124081668256458</a:t>
             </a:r>
           </a:p>
         </p:txBody>
@@ -9620,7 +9095,7 @@
           <a:lstStyle/>
           <a:p>
             <a:r>
-              <a:t>RMSE mp4v-RS_z : 0.05000641590932328</a:t>
+              <a:t>RMSE mp4v-RE_x : 0.047867688511619655</a:t>
             </a:r>
           </a:p>
         </p:txBody>
@@ -9724,7 +9199,7 @@
           <a:lstStyle/>
           <a:p>
             <a:r>
-              <a:t>RMSE xvid-LS_y : 0.00697933693941415</a:t>
+              <a:t>RMSE xvid-LS_z : 0.08044360950488275</a:t>
             </a:r>
           </a:p>
         </p:txBody>
@@ -9828,7 +9303,7 @@
           <a:lstStyle/>
           <a:p>
             <a:r>
-              <a:t>RMSE b48r-RS_z : 0.05166355376846673</a:t>
+              <a:t>RMSE b48r-RE_x : 0.04923305447584379</a:t>
             </a:r>
           </a:p>
         </p:txBody>
@@ -9932,7 +9407,7 @@
           <a:lstStyle/>
           <a:p>
             <a:r>
-              <a:t>RMSE xvid-RE_x : 0.014249802768919732</a:t>
+              <a:t>RMSE xvid-RE_y : 0.03385914324777704</a:t>
             </a:r>
           </a:p>
         </p:txBody>
@@ -10036,7 +9511,7 @@
           <a:lstStyle/>
           <a:p>
             <a:r>
-              <a:t>RMSE iyuv-RE_x : 0.013275976361991522</a:t>
+              <a:t>RMSE iyuv-RE_y : 0.031193014301445932</a:t>
             </a:r>
           </a:p>
         </p:txBody>
@@ -10140,7 +9615,7 @@
           <a:lstStyle/>
           <a:p>
             <a:r>
-              <a:t>RMSE mjpg-RE_x : 0.02210473002008682</a:t>
+              <a:t>RMSE mjpg-RE_y : 0.01772155618100104</a:t>
             </a:r>
           </a:p>
         </p:txBody>
@@ -10244,7 +9719,7 @@
           <a:lstStyle/>
           <a:p>
             <a:r>
-              <a:t>RMSE mp4v-RE_x : 0.014249802768919732</a:t>
+              <a:t>RMSE mp4v-RE_y : 0.03385914324777704</a:t>
             </a:r>
           </a:p>
         </p:txBody>
@@ -10348,7 +9823,7 @@
           <a:lstStyle/>
           <a:p>
             <a:r>
-              <a:t>RMSE b48r-RE_x : 0.013275976361991522</a:t>
+              <a:t>RMSE b48r-RE_y : 0.031193014301445932</a:t>
             </a:r>
           </a:p>
         </p:txBody>
@@ -10452,7 +9927,7 @@
           <a:lstStyle/>
           <a:p>
             <a:r>
-              <a:t>RMSE xvid-RE_y : 0.014464312975949165</a:t>
+              <a:t>RMSE xvid-RE_z : 0.1585124466442866</a:t>
             </a:r>
           </a:p>
         </p:txBody>
@@ -10556,7 +10031,7 @@
           <a:lstStyle/>
           <a:p>
             <a:r>
-              <a:t>RMSE iyuv-RE_y : 0.008681613336412706</a:t>
+              <a:t>RMSE iyuv-RE_z : 0.16424454324132107</a:t>
             </a:r>
           </a:p>
         </p:txBody>
@@ -10660,7 +10135,7 @@
           <a:lstStyle/>
           <a:p>
             <a:r>
-              <a:t>RMSE mjpg-RE_y : 0.017215347322329686</a:t>
+              <a:t>RMSE mjpg-RE_z : 0.06806799725488709</a:t>
             </a:r>
           </a:p>
         </p:txBody>
@@ -10764,7 +10239,7 @@
           <a:lstStyle/>
           <a:p>
             <a:r>
-              <a:t>RMSE mp4v-RE_y : 0.014464312975949165</a:t>
+              <a:t>RMSE mp4v-RE_z : 0.1585124466442866</a:t>
             </a:r>
           </a:p>
         </p:txBody>
@@ -10868,7 +10343,7 @@
           <a:lstStyle/>
           <a:p>
             <a:r>
-              <a:t>RMSE iyuv-LS_y : 0.005225805951829265</a:t>
+              <a:t>RMSE iyuv-LS_z : 0.05422517162491664</a:t>
             </a:r>
           </a:p>
         </p:txBody>
@@ -10972,7 +10447,7 @@
           <a:lstStyle/>
           <a:p>
             <a:r>
-              <a:t>RMSE b48r-RE_y : 0.008681613336412706</a:t>
+              <a:t>RMSE b48r-RE_z : 0.16424454324132107</a:t>
             </a:r>
           </a:p>
         </p:txBody>
@@ -11076,7 +10551,7 @@
           <a:lstStyle/>
           <a:p>
             <a:r>
-              <a:t>RMSE xvid-RE_z : 0.07947650898641075</a:t>
+              <a:t>RMSE xvid-RW_x : 0.024730429388077617</a:t>
             </a:r>
           </a:p>
         </p:txBody>
@@ -11180,7 +10655,7 @@
           <a:lstStyle/>
           <a:p>
             <a:r>
-              <a:t>RMSE iyuv-RE_z : 0.04747506044319716</a:t>
+              <a:t>RMSE iyuv-RW_x : 0.025070366217768682</a:t>
             </a:r>
           </a:p>
         </p:txBody>
@@ -11284,7 +10759,7 @@
           <a:lstStyle/>
           <a:p>
             <a:r>
-              <a:t>RMSE mjpg-RE_z : 0.07980560411096879</a:t>
+              <a:t>RMSE mjpg-RW_x : 0.022268245085222904</a:t>
             </a:r>
           </a:p>
         </p:txBody>
@@ -11388,7 +10863,7 @@
           <a:lstStyle/>
           <a:p>
             <a:r>
-              <a:t>RMSE mp4v-RE_z : 0.07947650898641075</a:t>
+              <a:t>RMSE mp4v-RW_x : 0.024730429388077617</a:t>
             </a:r>
           </a:p>
         </p:txBody>
@@ -11492,7 +10967,7 @@
           <a:lstStyle/>
           <a:p>
             <a:r>
-              <a:t>RMSE b48r-RE_z : 0.04747506044319716</a:t>
+              <a:t>RMSE b48r-RW_x : 0.025070366217768682</a:t>
             </a:r>
           </a:p>
         </p:txBody>
@@ -11596,7 +11071,7 @@
           <a:lstStyle/>
           <a:p>
             <a:r>
-              <a:t>RMSE xvid-RW_x : 0.018020053090852396</a:t>
+              <a:t>RMSE xvid-RW_y : 0.02655248768879946</a:t>
             </a:r>
           </a:p>
         </p:txBody>
@@ -11700,7 +11175,7 @@
           <a:lstStyle/>
           <a:p>
             <a:r>
-              <a:t>RMSE iyuv-RW_x : 0.01883526163984029</a:t>
+              <a:t>RMSE iyuv-RW_y : 0.02618527322533176</a:t>
             </a:r>
           </a:p>
         </p:txBody>
@@ -11804,7 +11279,7 @@
           <a:lstStyle/>
           <a:p>
             <a:r>
-              <a:t>RMSE mjpg-RW_x : 0.01851072747145862</a:t>
+              <a:t>RMSE mjpg-RW_y : 0.01564677301209256</a:t>
             </a:r>
           </a:p>
         </p:txBody>
@@ -11908,7 +11383,7 @@
           <a:lstStyle/>
           <a:p>
             <a:r>
-              <a:t>RMSE mp4v-RW_x : 0.018020053090852396</a:t>
+              <a:t>RMSE mp4v-RW_y : 0.02655248768879946</a:t>
             </a:r>
           </a:p>
         </p:txBody>
@@ -12012,7 +11487,7 @@
           <a:lstStyle/>
           <a:p>
             <a:r>
-              <a:t>RMSE mjpg-LS_y : 0.004367788096263414</a:t>
+              <a:t>RMSE mjpg-LS_z : 0.05449276558470684</a:t>
             </a:r>
           </a:p>
         </p:txBody>
@@ -12116,7 +11591,7 @@
           <a:lstStyle/>
           <a:p>
             <a:r>
-              <a:t>RMSE b48r-RW_x : 0.01883526163984029</a:t>
+              <a:t>RMSE b48r-RW_y : 0.02618527322533176</a:t>
             </a:r>
           </a:p>
         </p:txBody>
@@ -12220,7 +11695,7 @@
           <a:lstStyle/>
           <a:p>
             <a:r>
-              <a:t>RMSE xvid-RW_y : 0.021455455648260492</a:t>
+              <a:t>RMSE xvid-RW_z : 0.10851026936295509</a:t>
             </a:r>
           </a:p>
         </p:txBody>
@@ -12324,7 +11799,7 @@
           <a:lstStyle/>
           <a:p>
             <a:r>
-              <a:t>RMSE iyuv-RW_y : 0.03375928192918407</a:t>
+              <a:t>RMSE iyuv-RW_z : 0.10839370761824094</a:t>
             </a:r>
           </a:p>
         </p:txBody>
@@ -12428,7 +11903,7 @@
           <a:lstStyle/>
           <a:p>
             <a:r>
-              <a:t>RMSE mjpg-RW_y : 0.02089693209300252</a:t>
+              <a:t>RMSE mjpg-RW_z : 0.05584212277127043</a:t>
             </a:r>
           </a:p>
         </p:txBody>
@@ -12532,7 +12007,7 @@
           <a:lstStyle/>
           <a:p>
             <a:r>
-              <a:t>RMSE mp4v-RW_y : 0.021455455648260492</a:t>
+              <a:t>RMSE mp4v-RW_z : 0.10851026936295509</a:t>
             </a:r>
           </a:p>
         </p:txBody>
@@ -12636,7 +12111,7 @@
           <a:lstStyle/>
           <a:p>
             <a:r>
-              <a:t>RMSE b48r-RW_y : 0.03375928192918407</a:t>
+              <a:t>RMSE b48r-RW_z : 0.10839370761824094</a:t>
             </a:r>
           </a:p>
         </p:txBody>
@@ -12740,7 +12215,7 @@
           <a:lstStyle/>
           <a:p>
             <a:r>
-              <a:t>RMSE xvid-RW_z : 0.07068748504726144</a:t>
+              <a:t>RMSE xvid-TR_x : 0.04388009828987548</a:t>
             </a:r>
           </a:p>
         </p:txBody>
@@ -12844,7 +12319,7 @@
           <a:lstStyle/>
           <a:p>
             <a:r>
-              <a:t>RMSE iyuv-RW_z : 0.10038058106108644</a:t>
+              <a:t>RMSE iyuv-TR_x : 0.042318939129158135</a:t>
             </a:r>
           </a:p>
         </p:txBody>
@@ -12948,7 +12423,7 @@
           <a:lstStyle/>
           <a:p>
             <a:r>
-              <a:t>RMSE mjpg-RW_z : 0.06602729455285757</a:t>
+              <a:t>RMSE mjpg-TR_x : 0.018545102560947508</a:t>
             </a:r>
           </a:p>
         </p:txBody>
@@ -13052,7 +12527,7 @@
           <a:lstStyle/>
           <a:p>
             <a:r>
-              <a:t>RMSE mp4v-RW_z : 0.07068748504726144</a:t>
+              <a:t>RMSE mp4v-TR_x : 0.04388009828987548</a:t>
             </a:r>
           </a:p>
         </p:txBody>
@@ -13156,7 +12631,7 @@
           <a:lstStyle/>
           <a:p>
             <a:r>
-              <a:t>RMSE mp4v-LS_y : 0.00697933693941415</a:t>
+              <a:t>RMSE mp4v-LS_z : 0.08044360950488275</a:t>
             </a:r>
           </a:p>
         </p:txBody>
@@ -13260,7 +12735,7 @@
           <a:lstStyle/>
           <a:p>
             <a:r>
-              <a:t>RMSE b48r-RW_z : 0.10038058106108644</a:t>
+              <a:t>RMSE b48r-TR_x : 0.042318939129158135</a:t>
             </a:r>
           </a:p>
         </p:txBody>
@@ -13364,7 +12839,7 @@
           <a:lstStyle/>
           <a:p>
             <a:r>
-              <a:t>RMSE xvid-TR_x : 0.015382184468717095</a:t>
+              <a:t>RMSE xvid-TR_y : 0.008333738320871562</a:t>
             </a:r>
           </a:p>
         </p:txBody>
@@ -13468,7 +12943,7 @@
           <a:lstStyle/>
           <a:p>
             <a:r>
-              <a:t>RMSE iyuv-TR_x : 0.013074137662660131</a:t>
+              <a:t>RMSE iyuv-TR_y : 0.008722189790476382</a:t>
             </a:r>
           </a:p>
         </p:txBody>
@@ -13572,7 +13047,7 @@
           <a:lstStyle/>
           <a:p>
             <a:r>
-              <a:t>RMSE mjpg-TR_x : 0.013719807736982316</a:t>
+              <a:t>RMSE mjpg-TR_y : 0.003966957883646865</a:t>
             </a:r>
           </a:p>
         </p:txBody>
@@ -13676,7 +13151,7 @@
           <a:lstStyle/>
           <a:p>
             <a:r>
-              <a:t>RMSE mp4v-TR_x : 0.015382184468717095</a:t>
+              <a:t>RMSE mp4v-TR_y : 0.008333738320871562</a:t>
             </a:r>
           </a:p>
         </p:txBody>
@@ -13780,7 +13255,7 @@
           <a:lstStyle/>
           <a:p>
             <a:r>
-              <a:t>RMSE b48r-TR_x : 0.013074137662660131</a:t>
+              <a:t>RMSE b48r-TR_y : 0.008722189790476382</a:t>
             </a:r>
           </a:p>
         </p:txBody>
@@ -13884,7 +13359,7 @@
           <a:lstStyle/>
           <a:p>
             <a:r>
-              <a:t>RMSE xvid-TR_y : 0.0033812574240406693</a:t>
+              <a:t>RMSE xvid-TR_z : 0.13880298681506292</a:t>
             </a:r>
           </a:p>
         </p:txBody>
@@ -13988,7 +13463,7 @@
           <a:lstStyle/>
           <a:p>
             <a:r>
-              <a:t>RMSE iyuv-TR_y : 0.0033223508189761455</a:t>
+              <a:t>RMSE iyuv-TR_z : 0.13853737019637816</a:t>
             </a:r>
           </a:p>
         </p:txBody>
@@ -14092,7 +13567,7 @@
           <a:lstStyle/>
           <a:p>
             <a:r>
-              <a:t>RMSE mjpg-TR_y : 0.0044991019039344</a:t>
+              <a:t>RMSE mjpg-TR_z : 0.055896519414521104</a:t>
             </a:r>
           </a:p>
         </p:txBody>
@@ -14196,7 +13671,7 @@
           <a:lstStyle/>
           <a:p>
             <a:r>
-              <a:t>RMSE mp4v-TR_y : 0.0033812574240406693</a:t>
+              <a:t>RMSE mp4v-TR_z : 0.13880298681506292</a:t>
             </a:r>
           </a:p>
         </p:txBody>

</xml_diff>